<commit_message>
added slides and pictures, corrected dates
</commit_message>
<xml_diff>
--- a/proposal/Presentation/Proposal Presentation.pptx
+++ b/proposal/Presentation/Proposal Presentation.pptx
@@ -13,10 +13,10 @@
     <p:sldMasterId id="2147483849" r:id="rId9"/>
   </p:sldMasterIdLst>
   <p:notesMasterIdLst>
-    <p:notesMasterId r:id="rId21"/>
+    <p:notesMasterId r:id="rId22"/>
   </p:notesMasterIdLst>
   <p:handoutMasterIdLst>
-    <p:handoutMasterId r:id="rId22"/>
+    <p:handoutMasterId r:id="rId23"/>
   </p:handoutMasterIdLst>
   <p:sldIdLst>
     <p:sldId id="268" r:id="rId10"/>
@@ -24,12 +24,13 @@
     <p:sldId id="276" r:id="rId12"/>
     <p:sldId id="277" r:id="rId13"/>
     <p:sldId id="270" r:id="rId14"/>
-    <p:sldId id="271" r:id="rId15"/>
-    <p:sldId id="269" r:id="rId16"/>
-    <p:sldId id="273" r:id="rId17"/>
-    <p:sldId id="274" r:id="rId18"/>
-    <p:sldId id="275" r:id="rId19"/>
-    <p:sldId id="267" r:id="rId20"/>
+    <p:sldId id="279" r:id="rId15"/>
+    <p:sldId id="271" r:id="rId16"/>
+    <p:sldId id="269" r:id="rId17"/>
+    <p:sldId id="273" r:id="rId18"/>
+    <p:sldId id="274" r:id="rId19"/>
+    <p:sldId id="275" r:id="rId20"/>
+    <p:sldId id="267" r:id="rId21"/>
   </p:sldIdLst>
   <p:sldSz cx="12187238" cy="6858000"/>
   <p:notesSz cx="7099300" cy="10234613"/>
@@ -288,7 +289,7 @@
               <a:rPr lang="de-DE" smtClean="0">
                 <a:latin typeface="Arial" panose="020B0604020202020204" pitchFamily="34" charset="0"/>
               </a:rPr>
-              <a:t>10.03.2018</a:t>
+              <a:t>11.03.2018</a:t>
             </a:fld>
             <a:endParaRPr lang="de-DE" dirty="0">
               <a:latin typeface="Arial" panose="020B0604020202020204" pitchFamily="34" charset="0"/>
@@ -473,7 +474,7 @@
             <a:fld id="{BCDB334D-D17F-49C4-91DD-37BB7E818209}" type="datetimeFigureOut">
               <a:rPr lang="de-CH" smtClean="0"/>
               <a:pPr/>
-              <a:t>10.03.2018</a:t>
+              <a:t>11.03.2018</a:t>
             </a:fld>
             <a:endParaRPr lang="de-CH" dirty="0"/>
           </a:p>
@@ -855,6 +856,119 @@
     <p:extLst>
       <p:ext uri="{BB962C8B-B14F-4D97-AF65-F5344CB8AC3E}">
         <p14:creationId xmlns:p14="http://schemas.microsoft.com/office/powerpoint/2010/main" val="3295951888"/>
+      </p:ext>
+    </p:extLst>
+  </p:cSld>
+  <p:clrMapOvr>
+    <a:masterClrMapping/>
+  </p:clrMapOvr>
+</p:notes>
+</file>
+
+<file path=ppt/notesSlides/notesSlide2.xml><?xml version="1.0" encoding="utf-8"?>
+<p:notes xmlns:a="http://schemas.openxmlformats.org/drawingml/2006/main" xmlns:r="http://schemas.openxmlformats.org/officeDocument/2006/relationships" xmlns:p="http://schemas.openxmlformats.org/presentationml/2006/main">
+  <p:cSld>
+    <p:spTree>
+      <p:nvGrpSpPr>
+        <p:cNvPr id="1" name=""/>
+        <p:cNvGrpSpPr/>
+        <p:nvPr/>
+      </p:nvGrpSpPr>
+      <p:grpSpPr>
+        <a:xfrm>
+          <a:off x="0" y="0"/>
+          <a:ext cx="0" cy="0"/>
+          <a:chOff x="0" y="0"/>
+          <a:chExt cx="0" cy="0"/>
+        </a:xfrm>
+      </p:grpSpPr>
+      <p:sp>
+        <p:nvSpPr>
+          <p:cNvPr id="2" name="Folienbildplatzhalter 1"/>
+          <p:cNvSpPr>
+            <a:spLocks noGrp="1" noRot="1" noChangeAspect="1"/>
+          </p:cNvSpPr>
+          <p:nvPr>
+            <p:ph type="sldImg"/>
+          </p:nvPr>
+        </p:nvSpPr>
+        <p:spPr/>
+      </p:sp>
+      <p:sp>
+        <p:nvSpPr>
+          <p:cNvPr id="3" name="Notizenplatzhalter 2"/>
+          <p:cNvSpPr>
+            <a:spLocks noGrp="1"/>
+          </p:cNvSpPr>
+          <p:nvPr>
+            <p:ph type="body" idx="1"/>
+          </p:nvPr>
+        </p:nvSpPr>
+        <p:spPr/>
+        <p:txBody>
+          <a:bodyPr/>
+          <a:lstStyle/>
+          <a:p>
+            <a:endParaRPr lang="de-CH"/>
+          </a:p>
+        </p:txBody>
+      </p:sp>
+      <p:sp>
+        <p:nvSpPr>
+          <p:cNvPr id="4" name="Foliennummernplatzhalter 3"/>
+          <p:cNvSpPr>
+            <a:spLocks noGrp="1"/>
+          </p:cNvSpPr>
+          <p:nvPr>
+            <p:ph type="sldNum" sz="quarter" idx="10"/>
+          </p:nvPr>
+        </p:nvSpPr>
+        <p:spPr/>
+        <p:txBody>
+          <a:bodyPr/>
+          <a:lstStyle/>
+          <a:p>
+            <a:fld id="{A51C0C35-A9A2-4EFD-9BAF-1E52E29E03D1}" type="slidenum">
+              <a:rPr lang="de-CH" smtClean="0"/>
+              <a:t>6</a:t>
+            </a:fld>
+            <a:endParaRPr lang="de-CH"/>
+          </a:p>
+        </p:txBody>
+      </p:sp>
+      <p:sp>
+        <p:nvSpPr>
+          <p:cNvPr id="5" name="Fußzeilenplatzhalter 4">
+            <a:extLst>
+              <a:ext uri="{FF2B5EF4-FFF2-40B4-BE49-F238E27FC236}">
+                <a16:creationId xmlns:a16="http://schemas.microsoft.com/office/drawing/2014/main" id="{6F06002D-347F-4908-A948-C7F8398E0E65}"/>
+              </a:ext>
+            </a:extLst>
+          </p:cNvPr>
+          <p:cNvSpPr>
+            <a:spLocks noGrp="1"/>
+          </p:cNvSpPr>
+          <p:nvPr>
+            <p:ph type="ftr" sz="quarter" idx="11"/>
+          </p:nvPr>
+        </p:nvSpPr>
+        <p:spPr/>
+        <p:txBody>
+          <a:bodyPr/>
+          <a:lstStyle/>
+          <a:p>
+            <a:r>
+              <a:rPr lang="de-CH"/>
+              <a:t>Noah Isaak, Max Hürlimann</a:t>
+            </a:r>
+            <a:endParaRPr lang="de-CH" dirty="0"/>
+          </a:p>
+        </p:txBody>
+      </p:sp>
+    </p:spTree>
+    <p:extLst>
+      <p:ext uri="{BB962C8B-B14F-4D97-AF65-F5344CB8AC3E}">
+        <p14:creationId xmlns:p14="http://schemas.microsoft.com/office/powerpoint/2010/main" val="2068282092"/>
       </p:ext>
     </p:extLst>
   </p:cSld>
@@ -41496,10 +41610,9 @@
           <a:lstStyle/>
           <a:p>
             <a:r>
-              <a:rPr lang="de-DE"/>
-              <a:t>1.12.2014</a:t>
-            </a:r>
-            <a:endParaRPr lang="en-GB" dirty="0"/>
+              <a:rPr lang="de-DE" dirty="0"/>
+              <a:t>11.3.2018</a:t>
+            </a:r>
           </a:p>
         </p:txBody>
       </p:sp>
@@ -41702,20 +41815,27 @@
       </p:sp>
       <p:sp>
         <p:nvSpPr>
-          <p:cNvPr id="9" name="Bildplatzhalter 8"/>
-          <p:cNvSpPr>
-            <a:spLocks noGrp="1"/>
-          </p:cNvSpPr>
-          <p:nvPr>
-            <p:ph type="pic" sz="quarter" idx="13"/>
+          <p:cNvPr id="9" name="Titel 8"/>
+          <p:cNvSpPr>
+            <a:spLocks noGrp="1"/>
+          </p:cNvSpPr>
+          <p:nvPr>
+            <p:ph type="title"/>
           </p:nvPr>
         </p:nvSpPr>
         <p:spPr/>
+        <p:txBody>
+          <a:bodyPr/>
+          <a:lstStyle/>
+          <a:p>
+            <a:endParaRPr lang="en-GB" dirty="0"/>
+          </a:p>
+        </p:txBody>
       </p:sp>
     </p:spTree>
     <p:extLst>
       <p:ext uri="{BB962C8B-B14F-4D97-AF65-F5344CB8AC3E}">
-        <p14:creationId xmlns:p14="http://schemas.microsoft.com/office/powerpoint/2010/main" val="1116238283"/>
+        <p14:creationId xmlns:p14="http://schemas.microsoft.com/office/powerpoint/2010/main" val="3974297676"/>
       </p:ext>
     </p:extLst>
   </p:cSld>
@@ -41810,6 +41930,121 @@
               <a:rPr lang="en-GB" smtClean="0"/>
               <a:pPr/>
               <a:t>11</a:t>
+            </a:fld>
+            <a:endParaRPr lang="en-GB" dirty="0"/>
+          </a:p>
+        </p:txBody>
+      </p:sp>
+      <p:sp>
+        <p:nvSpPr>
+          <p:cNvPr id="9" name="Bildplatzhalter 8"/>
+          <p:cNvSpPr>
+            <a:spLocks noGrp="1"/>
+          </p:cNvSpPr>
+          <p:nvPr>
+            <p:ph type="pic" sz="quarter" idx="13"/>
+          </p:nvPr>
+        </p:nvSpPr>
+        <p:spPr/>
+      </p:sp>
+    </p:spTree>
+    <p:extLst>
+      <p:ext uri="{BB962C8B-B14F-4D97-AF65-F5344CB8AC3E}">
+        <p14:creationId xmlns:p14="http://schemas.microsoft.com/office/powerpoint/2010/main" val="1116238283"/>
+      </p:ext>
+    </p:extLst>
+  </p:cSld>
+  <p:clrMapOvr>
+    <a:masterClrMapping/>
+  </p:clrMapOvr>
+  <p:transition>
+    <p:fade/>
+  </p:transition>
+</p:sld>
+</file>
+
+<file path=ppt/slides/slide12.xml><?xml version="1.0" encoding="utf-8"?>
+<p:sld xmlns:a="http://schemas.openxmlformats.org/drawingml/2006/main" xmlns:r="http://schemas.openxmlformats.org/officeDocument/2006/relationships" xmlns:p="http://schemas.openxmlformats.org/presentationml/2006/main">
+  <p:cSld>
+    <p:spTree>
+      <p:nvGrpSpPr>
+        <p:cNvPr id="1" name=""/>
+        <p:cNvGrpSpPr/>
+        <p:nvPr/>
+      </p:nvGrpSpPr>
+      <p:grpSpPr>
+        <a:xfrm>
+          <a:off x="0" y="0"/>
+          <a:ext cx="0" cy="0"/>
+          <a:chOff x="0" y="0"/>
+          <a:chExt cx="0" cy="0"/>
+        </a:xfrm>
+      </p:grpSpPr>
+      <p:sp>
+        <p:nvSpPr>
+          <p:cNvPr id="2" name="Datumsplatzhalter 1"/>
+          <p:cNvSpPr>
+            <a:spLocks noGrp="1"/>
+          </p:cNvSpPr>
+          <p:nvPr>
+            <p:ph type="dt" sz="half" idx="10"/>
+          </p:nvPr>
+        </p:nvSpPr>
+        <p:spPr/>
+        <p:txBody>
+          <a:bodyPr/>
+          <a:lstStyle/>
+          <a:p>
+            <a:r>
+              <a:rPr lang="de-DE"/>
+              <a:t>1.12.2014</a:t>
+            </a:r>
+            <a:endParaRPr lang="en-GB" dirty="0"/>
+          </a:p>
+        </p:txBody>
+      </p:sp>
+      <p:sp>
+        <p:nvSpPr>
+          <p:cNvPr id="3" name="Fußzeilenplatzhalter 2"/>
+          <p:cNvSpPr>
+            <a:spLocks noGrp="1"/>
+          </p:cNvSpPr>
+          <p:nvPr>
+            <p:ph type="ftr" sz="quarter" idx="11"/>
+          </p:nvPr>
+        </p:nvSpPr>
+        <p:spPr/>
+        <p:txBody>
+          <a:bodyPr/>
+          <a:lstStyle/>
+          <a:p>
+            <a:r>
+              <a:rPr lang="en-GB"/>
+              <a:t>Noah Isaak, Max Hürlimann</a:t>
+            </a:r>
+            <a:endParaRPr lang="en-GB" dirty="0"/>
+          </a:p>
+        </p:txBody>
+      </p:sp>
+      <p:sp>
+        <p:nvSpPr>
+          <p:cNvPr id="4" name="Foliennummernplatzhalter 3"/>
+          <p:cNvSpPr>
+            <a:spLocks noGrp="1"/>
+          </p:cNvSpPr>
+          <p:nvPr>
+            <p:ph type="sldNum" sz="quarter" idx="12"/>
+          </p:nvPr>
+        </p:nvSpPr>
+        <p:spPr/>
+        <p:txBody>
+          <a:bodyPr/>
+          <a:lstStyle/>
+          <a:p>
+            <a:fld id="{6C6AE60A-B69C-4790-82F7-3882EDF23186}" type="slidenum">
+              <a:rPr lang="en-GB" smtClean="0"/>
+              <a:pPr/>
+              <a:t>12</a:t>
             </a:fld>
             <a:endParaRPr lang="en-GB" dirty="0"/>
           </a:p>
@@ -41891,10 +42126,9 @@
           <a:lstStyle/>
           <a:p>
             <a:r>
-              <a:rPr lang="de-DE"/>
-              <a:t>1.12.2014</a:t>
-            </a:r>
-            <a:endParaRPr lang="en-GB" dirty="0"/>
+              <a:rPr lang="de-DE" dirty="0"/>
+              <a:t>11.3.2018</a:t>
+            </a:r>
           </a:p>
         </p:txBody>
       </p:sp>
@@ -42090,10 +42324,9 @@
           <a:lstStyle/>
           <a:p>
             <a:r>
-              <a:rPr lang="de-DE"/>
-              <a:t>1.12.2014</a:t>
-            </a:r>
-            <a:endParaRPr lang="en-GB" dirty="0"/>
+              <a:rPr lang="de-DE" dirty="0"/>
+              <a:t>11.3.2018</a:t>
+            </a:r>
           </a:p>
         </p:txBody>
       </p:sp>
@@ -42340,10 +42573,9 @@
           <a:lstStyle/>
           <a:p>
             <a:r>
-              <a:rPr lang="de-DE"/>
-              <a:t>1.12.2014</a:t>
-            </a:r>
-            <a:endParaRPr lang="en-GB" dirty="0"/>
+              <a:rPr lang="de-DE" dirty="0"/>
+              <a:t>11.3.2018</a:t>
+            </a:r>
           </a:p>
         </p:txBody>
       </p:sp>
@@ -42727,23 +42959,31 @@
             <p:ph type="ctrTitle"/>
           </p:nvPr>
         </p:nvSpPr>
-        <p:spPr/>
+        <p:spPr>
+          <a:xfrm>
+            <a:off x="328850" y="620711"/>
+            <a:ext cx="11537950" cy="1013969"/>
+          </a:xfrm>
+        </p:spPr>
         <p:txBody>
           <a:bodyPr/>
           <a:lstStyle/>
           <a:p>
-            <a:endParaRPr lang="en-GB" dirty="0"/>
-          </a:p>
-        </p:txBody>
-      </p:sp>
-      <p:sp>
-        <p:nvSpPr>
-          <p:cNvPr id="12" name="Untertitel 11"/>
-          <p:cNvSpPr>
-            <a:spLocks noGrp="1"/>
-          </p:cNvSpPr>
-          <p:nvPr>
-            <p:ph type="subTitle" idx="1"/>
+            <a:r>
+              <a:rPr lang="en-GB" dirty="0"/>
+              <a:t>Approach</a:t>
+            </a:r>
+          </a:p>
+        </p:txBody>
+      </p:sp>
+      <p:sp>
+        <p:nvSpPr>
+          <p:cNvPr id="4" name="Datumsplatzhalter 3"/>
+          <p:cNvSpPr>
+            <a:spLocks noGrp="1"/>
+          </p:cNvSpPr>
+          <p:nvPr>
+            <p:ph type="dt" sz="half" idx="10"/>
           </p:nvPr>
         </p:nvSpPr>
         <p:spPr/>
@@ -42751,30 +42991,10 @@
           <a:bodyPr/>
           <a:lstStyle/>
           <a:p>
-            <a:endParaRPr lang="en-GB" dirty="0"/>
-          </a:p>
-        </p:txBody>
-      </p:sp>
-      <p:sp>
-        <p:nvSpPr>
-          <p:cNvPr id="4" name="Datumsplatzhalter 3"/>
-          <p:cNvSpPr>
-            <a:spLocks noGrp="1"/>
-          </p:cNvSpPr>
-          <p:nvPr>
-            <p:ph type="dt" sz="half" idx="10"/>
-          </p:nvPr>
-        </p:nvSpPr>
-        <p:spPr/>
-        <p:txBody>
-          <a:bodyPr/>
-          <a:lstStyle/>
-          <a:p>
-            <a:r>
-              <a:rPr lang="de-DE"/>
-              <a:t>1.12.2014</a:t>
-            </a:r>
-            <a:endParaRPr lang="en-GB" dirty="0"/>
+            <a:r>
+              <a:rPr lang="de-DE" dirty="0"/>
+              <a:t>11.3.2018</a:t>
+            </a:r>
           </a:p>
         </p:txBody>
       </p:sp>
@@ -42827,16 +43047,437 @@
       </p:sp>
       <p:sp>
         <p:nvSpPr>
-          <p:cNvPr id="13" name="Bildplatzhalter 12"/>
-          <p:cNvSpPr>
-            <a:spLocks noGrp="1"/>
-          </p:cNvSpPr>
-          <p:nvPr>
-            <p:ph type="pic" sz="quarter" idx="13"/>
-          </p:nvPr>
-        </p:nvSpPr>
-        <p:spPr/>
-      </p:sp>
+          <p:cNvPr id="7" name="Textfeld 6">
+            <a:extLst>
+              <a:ext uri="{FF2B5EF4-FFF2-40B4-BE49-F238E27FC236}">
+                <a16:creationId xmlns:a16="http://schemas.microsoft.com/office/drawing/2014/main" id="{C493B025-0A66-479E-9E9F-1F6B46E69952}"/>
+              </a:ext>
+            </a:extLst>
+          </p:cNvPr>
+          <p:cNvSpPr txBox="1"/>
+          <p:nvPr/>
+        </p:nvSpPr>
+        <p:spPr>
+          <a:xfrm>
+            <a:off x="549003" y="1916832"/>
+            <a:ext cx="7832593" cy="6001643"/>
+          </a:xfrm>
+          <a:prstGeom prst="rect">
+            <a:avLst/>
+          </a:prstGeom>
+          <a:noFill/>
+        </p:spPr>
+        <p:txBody>
+          <a:bodyPr wrap="none" rtlCol="0">
+            <a:spAutoFit/>
+          </a:bodyPr>
+          <a:lstStyle/>
+          <a:p>
+            <a:pPr marL="285750" indent="-285750">
+              <a:buFont typeface="Wingdings" panose="05000000000000000000" pitchFamily="2" charset="2"/>
+              <a:buChar char="§"/>
+            </a:pPr>
+            <a:r>
+              <a:rPr lang="de-CH" sz="2400" dirty="0" err="1"/>
+              <a:t>Get</a:t>
+            </a:r>
+            <a:r>
+              <a:rPr lang="de-CH" sz="2400" dirty="0"/>
+              <a:t> </a:t>
+            </a:r>
+            <a:r>
+              <a:rPr lang="de-CH" sz="2400" dirty="0" err="1"/>
+              <a:t>familiar</a:t>
+            </a:r>
+            <a:r>
+              <a:rPr lang="de-CH" sz="2400" dirty="0"/>
+              <a:t> </a:t>
+            </a:r>
+            <a:r>
+              <a:rPr lang="de-CH" sz="2400" dirty="0" err="1"/>
+              <a:t>with</a:t>
+            </a:r>
+            <a:r>
+              <a:rPr lang="de-CH" sz="2400" dirty="0"/>
+              <a:t> </a:t>
+            </a:r>
+            <a:r>
+              <a:rPr lang="de-CH" sz="2400" dirty="0" err="1"/>
+              <a:t>existing</a:t>
+            </a:r>
+            <a:r>
+              <a:rPr lang="de-CH" sz="2400" dirty="0"/>
+              <a:t> </a:t>
+            </a:r>
+            <a:r>
+              <a:rPr lang="de-CH" sz="2400" dirty="0" err="1"/>
+              <a:t>work</a:t>
+            </a:r>
+            <a:endParaRPr lang="de-CH" sz="2400" dirty="0"/>
+          </a:p>
+          <a:p>
+            <a:pPr marL="285750" indent="-285750">
+              <a:buFont typeface="Wingdings" panose="05000000000000000000" pitchFamily="2" charset="2"/>
+              <a:buChar char="§"/>
+            </a:pPr>
+            <a:endParaRPr lang="de-CH" sz="2400" dirty="0"/>
+          </a:p>
+          <a:p>
+            <a:pPr marL="285750" indent="-285750">
+              <a:buFont typeface="Wingdings" panose="05000000000000000000" pitchFamily="2" charset="2"/>
+              <a:buChar char="§"/>
+            </a:pPr>
+            <a:r>
+              <a:rPr lang="de-CH" sz="2400" dirty="0"/>
+              <a:t>Experiment </a:t>
+            </a:r>
+            <a:r>
+              <a:rPr lang="de-CH" sz="2400" dirty="0" err="1"/>
+              <a:t>with</a:t>
+            </a:r>
+            <a:r>
+              <a:rPr lang="de-CH" sz="2400" dirty="0"/>
+              <a:t> </a:t>
+            </a:r>
+            <a:r>
+              <a:rPr lang="de-CH" sz="2400" dirty="0" err="1"/>
+              <a:t>DispNet</a:t>
+            </a:r>
+            <a:r>
+              <a:rPr lang="de-CH" sz="2400" dirty="0"/>
+              <a:t> </a:t>
+            </a:r>
+            <a:r>
+              <a:rPr lang="de-CH" sz="2400" dirty="0" err="1"/>
+              <a:t>method</a:t>
+            </a:r>
+            <a:endParaRPr lang="de-CH" sz="2400" dirty="0"/>
+          </a:p>
+          <a:p>
+            <a:pPr marL="285750" indent="-285750">
+              <a:buFont typeface="Wingdings" panose="05000000000000000000" pitchFamily="2" charset="2"/>
+              <a:buChar char="§"/>
+            </a:pPr>
+            <a:endParaRPr lang="de-CH" sz="2400" dirty="0"/>
+          </a:p>
+          <a:p>
+            <a:pPr marL="285750" indent="-285750">
+              <a:buFont typeface="Wingdings" panose="05000000000000000000" pitchFamily="2" charset="2"/>
+              <a:buChar char="§"/>
+            </a:pPr>
+            <a:r>
+              <a:rPr lang="de-CH" sz="2400" dirty="0"/>
+              <a:t>Implement </a:t>
+            </a:r>
+            <a:r>
+              <a:rPr lang="de-CH" sz="2400" dirty="0" err="1"/>
+              <a:t>deep</a:t>
+            </a:r>
+            <a:r>
+              <a:rPr lang="de-CH" sz="2400" dirty="0"/>
+              <a:t> </a:t>
+            </a:r>
+            <a:r>
+              <a:rPr lang="de-CH" sz="2400" dirty="0" err="1"/>
+              <a:t>stereo</a:t>
+            </a:r>
+            <a:r>
+              <a:rPr lang="de-CH" sz="2400" dirty="0"/>
+              <a:t> </a:t>
+            </a:r>
+            <a:r>
+              <a:rPr lang="de-CH" sz="2400" dirty="0" err="1"/>
+              <a:t>method</a:t>
+            </a:r>
+            <a:r>
+              <a:rPr lang="de-CH" sz="2400" dirty="0"/>
+              <a:t> </a:t>
+            </a:r>
+            <a:r>
+              <a:rPr lang="de-CH" sz="2400" dirty="0" err="1"/>
+              <a:t>as</a:t>
+            </a:r>
+            <a:r>
+              <a:rPr lang="de-CH" sz="2400" dirty="0"/>
+              <a:t> </a:t>
+            </a:r>
+            <a:r>
+              <a:rPr lang="de-CH" sz="2400" dirty="0" err="1"/>
+              <a:t>first</a:t>
+            </a:r>
+            <a:r>
+              <a:rPr lang="de-CH" sz="2400" dirty="0"/>
+              <a:t> </a:t>
+            </a:r>
+            <a:r>
+              <a:rPr lang="de-CH" sz="2400" dirty="0" err="1"/>
+              <a:t>part</a:t>
+            </a:r>
+            <a:r>
+              <a:rPr lang="de-CH" sz="2400" dirty="0"/>
+              <a:t> </a:t>
+            </a:r>
+            <a:r>
+              <a:rPr lang="de-CH" sz="2400" dirty="0" err="1"/>
+              <a:t>of</a:t>
+            </a:r>
+            <a:r>
+              <a:rPr lang="de-CH" sz="2400" dirty="0"/>
+              <a:t> </a:t>
+            </a:r>
+            <a:r>
+              <a:rPr lang="de-CH" sz="2400" dirty="0" err="1"/>
+              <a:t>pipeline</a:t>
+            </a:r>
+            <a:endParaRPr lang="de-CH" sz="2400" dirty="0"/>
+          </a:p>
+          <a:p>
+            <a:pPr marL="285750" indent="-285750">
+              <a:buFont typeface="Wingdings" panose="05000000000000000000" pitchFamily="2" charset="2"/>
+              <a:buChar char="§"/>
+            </a:pPr>
+            <a:endParaRPr lang="de-CH" sz="2400" dirty="0"/>
+          </a:p>
+          <a:p>
+            <a:pPr marL="285750" indent="-285750">
+              <a:buFont typeface="Wingdings" panose="05000000000000000000" pitchFamily="2" charset="2"/>
+              <a:buChar char="§"/>
+            </a:pPr>
+            <a:r>
+              <a:rPr lang="de-CH" sz="2400" dirty="0" err="1"/>
+              <a:t>Unsupervised</a:t>
+            </a:r>
+            <a:r>
+              <a:rPr lang="de-CH" sz="2400" dirty="0"/>
+              <a:t> </a:t>
+            </a:r>
+            <a:r>
+              <a:rPr lang="de-CH" sz="2400" dirty="0" err="1"/>
+              <a:t>training</a:t>
+            </a:r>
+            <a:r>
+              <a:rPr lang="de-CH" sz="2400" dirty="0"/>
+              <a:t> </a:t>
+            </a:r>
+            <a:r>
+              <a:rPr lang="de-CH" sz="2400" dirty="0" err="1"/>
+              <a:t>of</a:t>
+            </a:r>
+            <a:r>
+              <a:rPr lang="de-CH" sz="2400" dirty="0"/>
+              <a:t> </a:t>
+            </a:r>
+            <a:r>
+              <a:rPr lang="de-CH" sz="2400" dirty="0" err="1"/>
+              <a:t>network</a:t>
+            </a:r>
+            <a:r>
+              <a:rPr lang="de-CH" sz="2400" dirty="0"/>
+              <a:t> </a:t>
+            </a:r>
+            <a:r>
+              <a:rPr lang="de-CH" sz="2400" dirty="0" err="1"/>
+              <a:t>with</a:t>
+            </a:r>
+            <a:r>
+              <a:rPr lang="de-CH" sz="2400" dirty="0"/>
+              <a:t> KITTI </a:t>
+            </a:r>
+            <a:r>
+              <a:rPr lang="de-CH" sz="2400" dirty="0" err="1"/>
+              <a:t>dataset</a:t>
+            </a:r>
+            <a:endParaRPr lang="de-CH" sz="2400" dirty="0"/>
+          </a:p>
+          <a:p>
+            <a:pPr marL="285750" indent="-285750">
+              <a:buFont typeface="Wingdings" panose="05000000000000000000" pitchFamily="2" charset="2"/>
+              <a:buChar char="§"/>
+            </a:pPr>
+            <a:endParaRPr lang="de-CH" sz="2400" dirty="0"/>
+          </a:p>
+          <a:p>
+            <a:pPr marL="285750" indent="-285750">
+              <a:buFont typeface="Wingdings" panose="05000000000000000000" pitchFamily="2" charset="2"/>
+              <a:buChar char="§"/>
+            </a:pPr>
+            <a:r>
+              <a:rPr lang="de-CH" sz="2400" dirty="0"/>
+              <a:t>Validation </a:t>
+            </a:r>
+            <a:r>
+              <a:rPr lang="de-CH" sz="2400" dirty="0" err="1"/>
+              <a:t>of</a:t>
+            </a:r>
+            <a:r>
+              <a:rPr lang="de-CH" sz="2400" dirty="0"/>
+              <a:t> </a:t>
+            </a:r>
+            <a:r>
+              <a:rPr lang="de-CH" sz="2400" dirty="0" err="1"/>
+              <a:t>results</a:t>
+            </a:r>
+            <a:endParaRPr lang="de-CH" sz="2400" dirty="0"/>
+          </a:p>
+          <a:p>
+            <a:pPr marL="285750" indent="-285750">
+              <a:buFont typeface="Wingdings" panose="05000000000000000000" pitchFamily="2" charset="2"/>
+              <a:buChar char="§"/>
+            </a:pPr>
+            <a:endParaRPr lang="de-CH" sz="2400" dirty="0"/>
+          </a:p>
+          <a:p>
+            <a:pPr marL="285750" indent="-285750">
+              <a:buFont typeface="Wingdings" panose="05000000000000000000" pitchFamily="2" charset="2"/>
+              <a:buChar char="§"/>
+            </a:pPr>
+            <a:r>
+              <a:rPr lang="de-CH" sz="2400" dirty="0" err="1"/>
+              <a:t>If</a:t>
+            </a:r>
+            <a:r>
+              <a:rPr lang="de-CH" sz="2400" dirty="0"/>
+              <a:t> time </a:t>
+            </a:r>
+            <a:r>
+              <a:rPr lang="de-CH" sz="2400" dirty="0" err="1"/>
+              <a:t>allows</a:t>
+            </a:r>
+            <a:r>
+              <a:rPr lang="de-CH" sz="2400" dirty="0"/>
+              <a:t>, </a:t>
+            </a:r>
+            <a:r>
+              <a:rPr lang="de-CH" sz="2400" dirty="0" err="1"/>
+              <a:t>implement</a:t>
+            </a:r>
+            <a:r>
+              <a:rPr lang="de-CH" sz="2400" dirty="0"/>
+              <a:t> an </a:t>
+            </a:r>
+            <a:r>
+              <a:rPr lang="de-CH" sz="2400" dirty="0" err="1"/>
+              <a:t>explanatory</a:t>
+            </a:r>
+            <a:r>
+              <a:rPr lang="de-CH" sz="2400" dirty="0"/>
+              <a:t> </a:t>
+            </a:r>
+            <a:r>
+              <a:rPr lang="de-CH" sz="2400" dirty="0" err="1"/>
+              <a:t>mask</a:t>
+            </a:r>
+            <a:endParaRPr lang="de-CH" sz="2400" dirty="0"/>
+          </a:p>
+          <a:p>
+            <a:pPr marL="285750" indent="-285750">
+              <a:buFont typeface="Wingdings" panose="05000000000000000000" pitchFamily="2" charset="2"/>
+              <a:buChar char="§"/>
+            </a:pPr>
+            <a:endParaRPr lang="de-CH" sz="2400" dirty="0"/>
+          </a:p>
+          <a:p>
+            <a:pPr marL="285750" indent="-285750">
+              <a:buFont typeface="Wingdings" panose="05000000000000000000" pitchFamily="2" charset="2"/>
+              <a:buChar char="§"/>
+            </a:pPr>
+            <a:endParaRPr lang="de-CH" sz="2400" dirty="0"/>
+          </a:p>
+          <a:p>
+            <a:pPr marL="285750" indent="-285750">
+              <a:buFont typeface="Wingdings" panose="05000000000000000000" pitchFamily="2" charset="2"/>
+              <a:buChar char="§"/>
+            </a:pPr>
+            <a:endParaRPr lang="de-CH" sz="2400" dirty="0"/>
+          </a:p>
+          <a:p>
+            <a:pPr marL="285750" indent="-285750">
+              <a:buFont typeface="Wingdings" panose="05000000000000000000" pitchFamily="2" charset="2"/>
+              <a:buChar char="§"/>
+            </a:pPr>
+            <a:endParaRPr lang="de-CH" sz="2400" dirty="0"/>
+          </a:p>
+          <a:p>
+            <a:pPr marL="285750" indent="-285750">
+              <a:buFont typeface="Wingdings" panose="05000000000000000000" pitchFamily="2" charset="2"/>
+              <a:buChar char="§"/>
+            </a:pPr>
+            <a:endParaRPr lang="de-CH" sz="2400" dirty="0"/>
+          </a:p>
+        </p:txBody>
+      </p:sp>
+      <p:pic>
+        <p:nvPicPr>
+          <p:cNvPr id="16" name="Grafik 15">
+            <a:extLst>
+              <a:ext uri="{FF2B5EF4-FFF2-40B4-BE49-F238E27FC236}">
+                <a16:creationId xmlns:a16="http://schemas.microsoft.com/office/drawing/2014/main" id="{15E87F03-AA5B-41C7-975D-DC2480F0D3C1}"/>
+              </a:ext>
+            </a:extLst>
+          </p:cNvPr>
+          <p:cNvPicPr>
+            <a:picLocks noChangeAspect="1"/>
+          </p:cNvPicPr>
+          <p:nvPr/>
+        </p:nvPicPr>
+        <p:blipFill>
+          <a:blip r:embed="rId3">
+            <a:extLst>
+              <a:ext uri="{28A0092B-C50C-407E-A947-70E740481C1C}">
+                <a14:useLocalDpi xmlns:a14="http://schemas.microsoft.com/office/drawing/2010/main" val="0"/>
+              </a:ext>
+            </a:extLst>
+          </a:blip>
+          <a:stretch>
+            <a:fillRect/>
+          </a:stretch>
+        </p:blipFill>
+        <p:spPr>
+          <a:xfrm>
+            <a:off x="9029728" y="2276872"/>
+            <a:ext cx="2482565" cy="2141004"/>
+          </a:xfrm>
+          <a:prstGeom prst="rect">
+            <a:avLst/>
+          </a:prstGeom>
+        </p:spPr>
+      </p:pic>
+      <p:pic>
+        <p:nvPicPr>
+          <p:cNvPr id="10" name="Grafik 9">
+            <a:extLst>
+              <a:ext uri="{FF2B5EF4-FFF2-40B4-BE49-F238E27FC236}">
+                <a16:creationId xmlns:a16="http://schemas.microsoft.com/office/drawing/2014/main" id="{BCDE4399-48FB-4222-ADF0-5D0CA380E2B9}"/>
+              </a:ext>
+            </a:extLst>
+          </p:cNvPr>
+          <p:cNvPicPr>
+            <a:picLocks noChangeAspect="1"/>
+          </p:cNvPicPr>
+          <p:nvPr/>
+        </p:nvPicPr>
+        <p:blipFill>
+          <a:blip r:embed="rId4">
+            <a:extLst>
+              <a:ext uri="{28A0092B-C50C-407E-A947-70E740481C1C}">
+                <a14:useLocalDpi xmlns:a14="http://schemas.microsoft.com/office/drawing/2010/main" val="0"/>
+              </a:ext>
+            </a:extLst>
+          </a:blip>
+          <a:stretch>
+            <a:fillRect/>
+          </a:stretch>
+        </p:blipFill>
+        <p:spPr>
+          <a:xfrm>
+            <a:off x="10916511" y="3861843"/>
+            <a:ext cx="1022535" cy="556033"/>
+          </a:xfrm>
+          <a:prstGeom prst="rect">
+            <a:avLst/>
+          </a:prstGeom>
+        </p:spPr>
+      </p:pic>
     </p:spTree>
     <p:extLst>
       <p:ext uri="{BB962C8B-B14F-4D97-AF65-F5344CB8AC3E}">
@@ -42854,6 +43495,373 @@
 </file>
 
 <file path=ppt/slides/slide6.xml><?xml version="1.0" encoding="utf-8"?>
+<p:sld xmlns:a="http://schemas.openxmlformats.org/drawingml/2006/main" xmlns:r="http://schemas.openxmlformats.org/officeDocument/2006/relationships" xmlns:p="http://schemas.openxmlformats.org/presentationml/2006/main">
+  <p:cSld>
+    <p:spTree>
+      <p:nvGrpSpPr>
+        <p:cNvPr id="1" name=""/>
+        <p:cNvGrpSpPr/>
+        <p:nvPr/>
+      </p:nvGrpSpPr>
+      <p:grpSpPr>
+        <a:xfrm>
+          <a:off x="0" y="0"/>
+          <a:ext cx="0" cy="0"/>
+          <a:chOff x="0" y="0"/>
+          <a:chExt cx="0" cy="0"/>
+        </a:xfrm>
+      </p:grpSpPr>
+      <p:sp>
+        <p:nvSpPr>
+          <p:cNvPr id="11" name="Titel 10"/>
+          <p:cNvSpPr>
+            <a:spLocks noGrp="1"/>
+          </p:cNvSpPr>
+          <p:nvPr>
+            <p:ph type="ctrTitle"/>
+          </p:nvPr>
+        </p:nvSpPr>
+        <p:spPr>
+          <a:xfrm>
+            <a:off x="328850" y="620711"/>
+            <a:ext cx="11537950" cy="1013969"/>
+          </a:xfrm>
+        </p:spPr>
+        <p:txBody>
+          <a:bodyPr/>
+          <a:lstStyle/>
+          <a:p>
+            <a:r>
+              <a:rPr lang="en-GB" dirty="0"/>
+              <a:t>Implementation</a:t>
+            </a:r>
+          </a:p>
+        </p:txBody>
+      </p:sp>
+      <p:sp>
+        <p:nvSpPr>
+          <p:cNvPr id="4" name="Datumsplatzhalter 3"/>
+          <p:cNvSpPr>
+            <a:spLocks noGrp="1"/>
+          </p:cNvSpPr>
+          <p:nvPr>
+            <p:ph type="dt" sz="half" idx="10"/>
+          </p:nvPr>
+        </p:nvSpPr>
+        <p:spPr/>
+        <p:txBody>
+          <a:bodyPr/>
+          <a:lstStyle/>
+          <a:p>
+            <a:r>
+              <a:rPr lang="de-DE" dirty="0"/>
+              <a:t>11.3.2018</a:t>
+            </a:r>
+            <a:endParaRPr lang="en-GB" dirty="0"/>
+          </a:p>
+        </p:txBody>
+      </p:sp>
+      <p:sp>
+        <p:nvSpPr>
+          <p:cNvPr id="5" name="Fußzeilenplatzhalter 4"/>
+          <p:cNvSpPr>
+            <a:spLocks noGrp="1"/>
+          </p:cNvSpPr>
+          <p:nvPr>
+            <p:ph type="ftr" sz="quarter" idx="11"/>
+          </p:nvPr>
+        </p:nvSpPr>
+        <p:spPr/>
+        <p:txBody>
+          <a:bodyPr/>
+          <a:lstStyle/>
+          <a:p>
+            <a:r>
+              <a:rPr lang="en-GB"/>
+              <a:t>Noah Isaak, Max Hürlimann</a:t>
+            </a:r>
+            <a:endParaRPr lang="en-GB" dirty="0"/>
+          </a:p>
+        </p:txBody>
+      </p:sp>
+      <p:sp>
+        <p:nvSpPr>
+          <p:cNvPr id="6" name="Foliennummernplatzhalter 5"/>
+          <p:cNvSpPr>
+            <a:spLocks noGrp="1"/>
+          </p:cNvSpPr>
+          <p:nvPr>
+            <p:ph type="sldNum" sz="quarter" idx="12"/>
+          </p:nvPr>
+        </p:nvSpPr>
+        <p:spPr/>
+        <p:txBody>
+          <a:bodyPr/>
+          <a:lstStyle/>
+          <a:p>
+            <a:fld id="{6C6AE60A-B69C-4790-82F7-3882EDF23186}" type="slidenum">
+              <a:rPr lang="en-GB" smtClean="0"/>
+              <a:pPr/>
+              <a:t>6</a:t>
+            </a:fld>
+            <a:endParaRPr lang="en-GB" dirty="0"/>
+          </a:p>
+        </p:txBody>
+      </p:sp>
+      <p:sp>
+        <p:nvSpPr>
+          <p:cNvPr id="7" name="Textfeld 6">
+            <a:extLst>
+              <a:ext uri="{FF2B5EF4-FFF2-40B4-BE49-F238E27FC236}">
+                <a16:creationId xmlns:a16="http://schemas.microsoft.com/office/drawing/2014/main" id="{C493B025-0A66-479E-9E9F-1F6B46E69952}"/>
+              </a:ext>
+            </a:extLst>
+          </p:cNvPr>
+          <p:cNvSpPr txBox="1"/>
+          <p:nvPr/>
+        </p:nvSpPr>
+        <p:spPr>
+          <a:xfrm>
+            <a:off x="549003" y="1916832"/>
+            <a:ext cx="473206" cy="1938992"/>
+          </a:xfrm>
+          <a:prstGeom prst="rect">
+            <a:avLst/>
+          </a:prstGeom>
+          <a:noFill/>
+        </p:spPr>
+        <p:txBody>
+          <a:bodyPr wrap="none" rtlCol="0">
+            <a:spAutoFit/>
+          </a:bodyPr>
+          <a:lstStyle/>
+          <a:p>
+            <a:endParaRPr lang="de-CH" sz="2400" dirty="0"/>
+          </a:p>
+          <a:p>
+            <a:pPr marL="285750" indent="-285750">
+              <a:buFont typeface="Wingdings" panose="05000000000000000000" pitchFamily="2" charset="2"/>
+              <a:buChar char="§"/>
+            </a:pPr>
+            <a:endParaRPr lang="de-CH" sz="2400" dirty="0"/>
+          </a:p>
+          <a:p>
+            <a:pPr marL="285750" indent="-285750">
+              <a:buFont typeface="Wingdings" panose="05000000000000000000" pitchFamily="2" charset="2"/>
+              <a:buChar char="§"/>
+            </a:pPr>
+            <a:endParaRPr lang="de-CH" sz="2400" dirty="0"/>
+          </a:p>
+          <a:p>
+            <a:pPr marL="285750" indent="-285750">
+              <a:buFont typeface="Wingdings" panose="05000000000000000000" pitchFamily="2" charset="2"/>
+              <a:buChar char="§"/>
+            </a:pPr>
+            <a:endParaRPr lang="de-CH" sz="2400" dirty="0"/>
+          </a:p>
+          <a:p>
+            <a:pPr marL="285750" indent="-285750">
+              <a:buFont typeface="Wingdings" panose="05000000000000000000" pitchFamily="2" charset="2"/>
+              <a:buChar char="§"/>
+            </a:pPr>
+            <a:endParaRPr lang="de-CH" sz="2400" dirty="0"/>
+          </a:p>
+        </p:txBody>
+      </p:sp>
+      <p:sp>
+        <p:nvSpPr>
+          <p:cNvPr id="2" name="Textfeld 1">
+            <a:extLst>
+              <a:ext uri="{FF2B5EF4-FFF2-40B4-BE49-F238E27FC236}">
+                <a16:creationId xmlns:a16="http://schemas.microsoft.com/office/drawing/2014/main" id="{7766CFA0-1B41-49BD-B989-A54B4B0B0B66}"/>
+              </a:ext>
+            </a:extLst>
+          </p:cNvPr>
+          <p:cNvSpPr txBox="1"/>
+          <p:nvPr/>
+        </p:nvSpPr>
+        <p:spPr>
+          <a:xfrm>
+            <a:off x="260971" y="1556792"/>
+            <a:ext cx="8429065" cy="3231654"/>
+          </a:xfrm>
+          <a:prstGeom prst="rect">
+            <a:avLst/>
+          </a:prstGeom>
+          <a:noFill/>
+        </p:spPr>
+        <p:txBody>
+          <a:bodyPr wrap="square" rtlCol="0">
+            <a:spAutoFit/>
+          </a:bodyPr>
+          <a:lstStyle/>
+          <a:p>
+            <a:pPr marL="342900" indent="-342900">
+              <a:buFont typeface="Wingdings" panose="05000000000000000000" pitchFamily="2" charset="2"/>
+              <a:buChar char="§"/>
+            </a:pPr>
+            <a:r>
+              <a:rPr lang="de-CH" sz="2400" dirty="0"/>
+              <a:t>Python</a:t>
+            </a:r>
+          </a:p>
+          <a:p>
+            <a:pPr marL="342900" indent="-342900">
+              <a:buFont typeface="Wingdings" panose="05000000000000000000" pitchFamily="2" charset="2"/>
+              <a:buChar char="§"/>
+            </a:pPr>
+            <a:endParaRPr lang="de-CH" sz="2400" dirty="0"/>
+          </a:p>
+          <a:p>
+            <a:pPr marL="342900" indent="-342900">
+              <a:buFont typeface="Wingdings" panose="05000000000000000000" pitchFamily="2" charset="2"/>
+              <a:buChar char="§"/>
+            </a:pPr>
+            <a:r>
+              <a:rPr lang="de-CH" sz="2400" dirty="0"/>
+              <a:t>Linux</a:t>
+            </a:r>
+          </a:p>
+          <a:p>
+            <a:pPr marL="342900" indent="-342900">
+              <a:buFont typeface="Wingdings" panose="05000000000000000000" pitchFamily="2" charset="2"/>
+              <a:buChar char="§"/>
+            </a:pPr>
+            <a:endParaRPr lang="de-CH" sz="2400" dirty="0"/>
+          </a:p>
+          <a:p>
+            <a:pPr marL="342900" indent="-342900">
+              <a:buFont typeface="Wingdings" panose="05000000000000000000" pitchFamily="2" charset="2"/>
+              <a:buChar char="§"/>
+            </a:pPr>
+            <a:r>
+              <a:rPr lang="de-CH" sz="2400" dirty="0" err="1"/>
+              <a:t>DispNet</a:t>
+            </a:r>
+            <a:endParaRPr lang="de-CH" sz="2400" dirty="0"/>
+          </a:p>
+          <a:p>
+            <a:pPr marL="800100" lvl="1" indent="-342900">
+              <a:buFont typeface="Wingdings" panose="05000000000000000000" pitchFamily="2" charset="2"/>
+              <a:buChar char="§"/>
+            </a:pPr>
+            <a:r>
+              <a:rPr lang="de-CH" dirty="0" err="1"/>
+              <a:t>For</a:t>
+            </a:r>
+            <a:r>
+              <a:rPr lang="de-CH" dirty="0"/>
+              <a:t> </a:t>
+            </a:r>
+            <a:r>
+              <a:rPr lang="de-CH" dirty="0" err="1"/>
+              <a:t>disparity</a:t>
+            </a:r>
+            <a:r>
+              <a:rPr lang="de-CH" dirty="0"/>
+              <a:t> </a:t>
+            </a:r>
+            <a:r>
+              <a:rPr lang="de-CH" dirty="0" err="1"/>
+              <a:t>estimation</a:t>
+            </a:r>
+            <a:endParaRPr lang="de-CH" dirty="0"/>
+          </a:p>
+          <a:p>
+            <a:pPr marL="342900" indent="-342900">
+              <a:buFont typeface="Wingdings" panose="05000000000000000000" pitchFamily="2" charset="2"/>
+              <a:buChar char="§"/>
+            </a:pPr>
+            <a:endParaRPr lang="de-CH" sz="2400" dirty="0"/>
+          </a:p>
+          <a:p>
+            <a:pPr marL="342900" indent="-342900">
+              <a:buFont typeface="Wingdings" panose="05000000000000000000" pitchFamily="2" charset="2"/>
+              <a:buChar char="§"/>
+            </a:pPr>
+            <a:r>
+              <a:rPr lang="de-CH" sz="2400" dirty="0" err="1"/>
+              <a:t>Tensorflow</a:t>
+            </a:r>
+            <a:r>
+              <a:rPr lang="de-CH" sz="2400" dirty="0"/>
+              <a:t>, </a:t>
+            </a:r>
+          </a:p>
+          <a:p>
+            <a:pPr marL="800100" lvl="1" indent="-342900">
+              <a:buFont typeface="Wingdings" panose="05000000000000000000" pitchFamily="2" charset="2"/>
+              <a:buChar char="§"/>
+            </a:pPr>
+            <a:r>
+              <a:rPr lang="de-CH" dirty="0"/>
+              <a:t>a </a:t>
+            </a:r>
+            <a:r>
+              <a:rPr lang="de-CH" dirty="0" err="1"/>
+              <a:t>widely</a:t>
+            </a:r>
+            <a:r>
+              <a:rPr lang="de-CH" dirty="0"/>
+              <a:t> </a:t>
+            </a:r>
+            <a:r>
+              <a:rPr lang="de-CH" dirty="0" err="1"/>
+              <a:t>used</a:t>
+            </a:r>
+            <a:r>
+              <a:rPr lang="de-CH" dirty="0"/>
+              <a:t> open-</a:t>
+            </a:r>
+            <a:r>
+              <a:rPr lang="de-CH" dirty="0" err="1"/>
+              <a:t>source</a:t>
+            </a:r>
+            <a:r>
+              <a:rPr lang="de-CH" dirty="0"/>
+              <a:t> </a:t>
+            </a:r>
+            <a:r>
+              <a:rPr lang="de-CH" dirty="0" err="1"/>
+              <a:t>machine</a:t>
+            </a:r>
+            <a:r>
+              <a:rPr lang="de-CH" dirty="0"/>
+              <a:t> </a:t>
+            </a:r>
+            <a:r>
+              <a:rPr lang="de-CH" dirty="0" err="1"/>
+              <a:t>learning</a:t>
+            </a:r>
+            <a:r>
+              <a:rPr lang="de-CH" dirty="0"/>
+              <a:t> </a:t>
+            </a:r>
+            <a:r>
+              <a:rPr lang="de-CH" dirty="0" err="1"/>
+              <a:t>framework</a:t>
+            </a:r>
+            <a:endParaRPr lang="de-CH" dirty="0"/>
+          </a:p>
+        </p:txBody>
+      </p:sp>
+    </p:spTree>
+    <p:extLst>
+      <p:ext uri="{BB962C8B-B14F-4D97-AF65-F5344CB8AC3E}">
+        <p14:creationId xmlns:p14="http://schemas.microsoft.com/office/powerpoint/2010/main" val="3001423055"/>
+      </p:ext>
+    </p:extLst>
+  </p:cSld>
+  <p:clrMapOvr>
+    <a:masterClrMapping/>
+  </p:clrMapOvr>
+  <p:transition>
+    <p:fade/>
+  </p:transition>
+</p:sld>
+</file>
+
+<file path=ppt/slides/slide7.xml><?xml version="1.0" encoding="utf-8"?>
 <p:sld xmlns:a="http://schemas.openxmlformats.org/drawingml/2006/main" xmlns:r="http://schemas.openxmlformats.org/officeDocument/2006/relationships" xmlns:p="http://schemas.openxmlformats.org/presentationml/2006/main">
   <p:cSld>
     <p:spTree>
@@ -43129,159 +44137,6 @@
 </p:sld>
 </file>
 
-<file path=ppt/slides/slide7.xml><?xml version="1.0" encoding="utf-8"?>
-<p:sld xmlns:a="http://schemas.openxmlformats.org/drawingml/2006/main" xmlns:r="http://schemas.openxmlformats.org/officeDocument/2006/relationships" xmlns:p="http://schemas.openxmlformats.org/presentationml/2006/main">
-  <p:cSld>
-    <p:spTree>
-      <p:nvGrpSpPr>
-        <p:cNvPr id="1" name=""/>
-        <p:cNvGrpSpPr/>
-        <p:nvPr/>
-      </p:nvGrpSpPr>
-      <p:grpSpPr>
-        <a:xfrm>
-          <a:off x="0" y="0"/>
-          <a:ext cx="0" cy="0"/>
-          <a:chOff x="0" y="0"/>
-          <a:chExt cx="0" cy="0"/>
-        </a:xfrm>
-      </p:grpSpPr>
-      <p:sp>
-        <p:nvSpPr>
-          <p:cNvPr id="11" name="Titel 10"/>
-          <p:cNvSpPr>
-            <a:spLocks noGrp="1"/>
-          </p:cNvSpPr>
-          <p:nvPr>
-            <p:ph type="ctrTitle"/>
-          </p:nvPr>
-        </p:nvSpPr>
-        <p:spPr/>
-        <p:txBody>
-          <a:bodyPr/>
-          <a:lstStyle/>
-          <a:p>
-            <a:endParaRPr lang="en-GB" dirty="0"/>
-          </a:p>
-        </p:txBody>
-      </p:sp>
-      <p:sp>
-        <p:nvSpPr>
-          <p:cNvPr id="12" name="Untertitel 11"/>
-          <p:cNvSpPr>
-            <a:spLocks noGrp="1"/>
-          </p:cNvSpPr>
-          <p:nvPr>
-            <p:ph type="subTitle" idx="1"/>
-          </p:nvPr>
-        </p:nvSpPr>
-        <p:spPr/>
-        <p:txBody>
-          <a:bodyPr/>
-          <a:lstStyle/>
-          <a:p>
-            <a:endParaRPr lang="en-GB" dirty="0"/>
-          </a:p>
-        </p:txBody>
-      </p:sp>
-      <p:sp>
-        <p:nvSpPr>
-          <p:cNvPr id="4" name="Datumsplatzhalter 3"/>
-          <p:cNvSpPr>
-            <a:spLocks noGrp="1"/>
-          </p:cNvSpPr>
-          <p:nvPr>
-            <p:ph type="dt" sz="half" idx="10"/>
-          </p:nvPr>
-        </p:nvSpPr>
-        <p:spPr/>
-        <p:txBody>
-          <a:bodyPr/>
-          <a:lstStyle/>
-          <a:p>
-            <a:r>
-              <a:rPr lang="de-DE"/>
-              <a:t>1.12.2014</a:t>
-            </a:r>
-            <a:endParaRPr lang="en-GB" dirty="0"/>
-          </a:p>
-        </p:txBody>
-      </p:sp>
-      <p:sp>
-        <p:nvSpPr>
-          <p:cNvPr id="5" name="Fußzeilenplatzhalter 4"/>
-          <p:cNvSpPr>
-            <a:spLocks noGrp="1"/>
-          </p:cNvSpPr>
-          <p:nvPr>
-            <p:ph type="ftr" sz="quarter" idx="11"/>
-          </p:nvPr>
-        </p:nvSpPr>
-        <p:spPr/>
-        <p:txBody>
-          <a:bodyPr/>
-          <a:lstStyle/>
-          <a:p>
-            <a:r>
-              <a:rPr lang="en-GB"/>
-              <a:t>Noah Isaak, Max Hürlimann</a:t>
-            </a:r>
-            <a:endParaRPr lang="en-GB" dirty="0"/>
-          </a:p>
-        </p:txBody>
-      </p:sp>
-      <p:sp>
-        <p:nvSpPr>
-          <p:cNvPr id="6" name="Foliennummernplatzhalter 5"/>
-          <p:cNvSpPr>
-            <a:spLocks noGrp="1"/>
-          </p:cNvSpPr>
-          <p:nvPr>
-            <p:ph type="sldNum" sz="quarter" idx="12"/>
-          </p:nvPr>
-        </p:nvSpPr>
-        <p:spPr/>
-        <p:txBody>
-          <a:bodyPr/>
-          <a:lstStyle/>
-          <a:p>
-            <a:fld id="{6C6AE60A-B69C-4790-82F7-3882EDF23186}" type="slidenum">
-              <a:rPr lang="en-GB" smtClean="0"/>
-              <a:pPr/>
-              <a:t>7</a:t>
-            </a:fld>
-            <a:endParaRPr lang="en-GB" dirty="0"/>
-          </a:p>
-        </p:txBody>
-      </p:sp>
-      <p:sp>
-        <p:nvSpPr>
-          <p:cNvPr id="13" name="Bildplatzhalter 12"/>
-          <p:cNvSpPr>
-            <a:spLocks noGrp="1"/>
-          </p:cNvSpPr>
-          <p:nvPr>
-            <p:ph type="pic" sz="quarter" idx="13"/>
-          </p:nvPr>
-        </p:nvSpPr>
-        <p:spPr/>
-      </p:sp>
-    </p:spTree>
-    <p:extLst>
-      <p:ext uri="{BB962C8B-B14F-4D97-AF65-F5344CB8AC3E}">
-        <p14:creationId xmlns:p14="http://schemas.microsoft.com/office/powerpoint/2010/main" val="3737279567"/>
-      </p:ext>
-    </p:extLst>
-  </p:cSld>
-  <p:clrMapOvr>
-    <a:masterClrMapping/>
-  </p:clrMapOvr>
-  <p:transition>
-    <p:fade/>
-  </p:transition>
-</p:sld>
-</file>
-
 <file path=ppt/slides/slide8.xml><?xml version="1.0" encoding="utf-8"?>
 <p:sld xmlns:a="http://schemas.openxmlformats.org/drawingml/2006/main" xmlns:r="http://schemas.openxmlformats.org/officeDocument/2006/relationships" xmlns:p="http://schemas.openxmlformats.org/presentationml/2006/main">
   <p:cSld>
@@ -43301,12 +44156,12 @@
       </p:grpSpPr>
       <p:sp>
         <p:nvSpPr>
-          <p:cNvPr id="12" name="Inhaltsplatzhalter 11"/>
-          <p:cNvSpPr>
-            <a:spLocks noGrp="1"/>
-          </p:cNvSpPr>
-          <p:nvPr>
-            <p:ph sz="half" idx="1"/>
+          <p:cNvPr id="11" name="Titel 10"/>
+          <p:cNvSpPr>
+            <a:spLocks noGrp="1"/>
+          </p:cNvSpPr>
+          <p:nvPr>
+            <p:ph type="ctrTitle"/>
           </p:nvPr>
         </p:nvSpPr>
         <p:spPr/>
@@ -43320,12 +44175,12 @@
       </p:sp>
       <p:sp>
         <p:nvSpPr>
-          <p:cNvPr id="13" name="Inhaltsplatzhalter 12"/>
-          <p:cNvSpPr>
-            <a:spLocks noGrp="1"/>
-          </p:cNvSpPr>
-          <p:nvPr>
-            <p:ph sz="half" idx="2"/>
+          <p:cNvPr id="12" name="Untertitel 11"/>
+          <p:cNvSpPr>
+            <a:spLocks noGrp="1"/>
+          </p:cNvSpPr>
+          <p:nvPr>
+            <p:ph type="subTitle" idx="1"/>
           </p:nvPr>
         </p:nvSpPr>
         <p:spPr/>
@@ -43409,27 +44264,20 @@
       </p:sp>
       <p:sp>
         <p:nvSpPr>
-          <p:cNvPr id="11" name="Titel 10"/>
-          <p:cNvSpPr>
-            <a:spLocks noGrp="1"/>
-          </p:cNvSpPr>
-          <p:nvPr>
-            <p:ph type="title"/>
+          <p:cNvPr id="13" name="Bildplatzhalter 12"/>
+          <p:cNvSpPr>
+            <a:spLocks noGrp="1"/>
+          </p:cNvSpPr>
+          <p:nvPr>
+            <p:ph type="pic" sz="quarter" idx="13"/>
           </p:nvPr>
         </p:nvSpPr>
         <p:spPr/>
-        <p:txBody>
-          <a:bodyPr/>
-          <a:lstStyle/>
-          <a:p>
-            <a:endParaRPr lang="en-GB" dirty="0"/>
-          </a:p>
-        </p:txBody>
       </p:sp>
     </p:spTree>
     <p:extLst>
       <p:ext uri="{BB962C8B-B14F-4D97-AF65-F5344CB8AC3E}">
-        <p14:creationId xmlns:p14="http://schemas.microsoft.com/office/powerpoint/2010/main" val="572143329"/>
+        <p14:creationId xmlns:p14="http://schemas.microsoft.com/office/powerpoint/2010/main" val="3737279567"/>
       </p:ext>
     </p:extLst>
   </p:cSld>
@@ -43461,12 +44309,12 @@
       </p:grpSpPr>
       <p:sp>
         <p:nvSpPr>
-          <p:cNvPr id="2" name="Datumsplatzhalter 1"/>
-          <p:cNvSpPr>
-            <a:spLocks noGrp="1"/>
-          </p:cNvSpPr>
-          <p:nvPr>
-            <p:ph type="dt" sz="half" idx="10"/>
+          <p:cNvPr id="12" name="Inhaltsplatzhalter 11"/>
+          <p:cNvSpPr>
+            <a:spLocks noGrp="1"/>
+          </p:cNvSpPr>
+          <p:nvPr>
+            <p:ph sz="half" idx="1"/>
           </p:nvPr>
         </p:nvSpPr>
         <p:spPr/>
@@ -43474,6 +44322,44 @@
           <a:bodyPr/>
           <a:lstStyle/>
           <a:p>
+            <a:endParaRPr lang="en-GB" dirty="0"/>
+          </a:p>
+        </p:txBody>
+      </p:sp>
+      <p:sp>
+        <p:nvSpPr>
+          <p:cNvPr id="13" name="Inhaltsplatzhalter 12"/>
+          <p:cNvSpPr>
+            <a:spLocks noGrp="1"/>
+          </p:cNvSpPr>
+          <p:nvPr>
+            <p:ph sz="half" idx="2"/>
+          </p:nvPr>
+        </p:nvSpPr>
+        <p:spPr/>
+        <p:txBody>
+          <a:bodyPr/>
+          <a:lstStyle/>
+          <a:p>
+            <a:endParaRPr lang="en-GB" dirty="0"/>
+          </a:p>
+        </p:txBody>
+      </p:sp>
+      <p:sp>
+        <p:nvSpPr>
+          <p:cNvPr id="4" name="Datumsplatzhalter 3"/>
+          <p:cNvSpPr>
+            <a:spLocks noGrp="1"/>
+          </p:cNvSpPr>
+          <p:nvPr>
+            <p:ph type="dt" sz="half" idx="10"/>
+          </p:nvPr>
+        </p:nvSpPr>
+        <p:spPr/>
+        <p:txBody>
+          <a:bodyPr/>
+          <a:lstStyle/>
+          <a:p>
             <a:r>
               <a:rPr lang="de-DE"/>
               <a:t>1.12.2014</a:t>
@@ -43484,7 +44370,7 @@
       </p:sp>
       <p:sp>
         <p:nvSpPr>
-          <p:cNvPr id="3" name="Fußzeilenplatzhalter 2"/>
+          <p:cNvPr id="5" name="Fußzeilenplatzhalter 4"/>
           <p:cNvSpPr>
             <a:spLocks noGrp="1"/>
           </p:cNvSpPr>
@@ -43507,7 +44393,7 @@
       </p:sp>
       <p:sp>
         <p:nvSpPr>
-          <p:cNvPr id="4" name="Foliennummernplatzhalter 3"/>
+          <p:cNvPr id="6" name="Foliennummernplatzhalter 5"/>
           <p:cNvSpPr>
             <a:spLocks noGrp="1"/>
           </p:cNvSpPr>
@@ -43531,7 +44417,7 @@
       </p:sp>
       <p:sp>
         <p:nvSpPr>
-          <p:cNvPr id="9" name="Titel 8"/>
+          <p:cNvPr id="11" name="Titel 10"/>
           <p:cNvSpPr>
             <a:spLocks noGrp="1"/>
           </p:cNvSpPr>
@@ -43551,7 +44437,7 @@
     </p:spTree>
     <p:extLst>
       <p:ext uri="{BB962C8B-B14F-4D97-AF65-F5344CB8AC3E}">
-        <p14:creationId xmlns:p14="http://schemas.microsoft.com/office/powerpoint/2010/main" val="3974297676"/>
+        <p14:creationId xmlns:p14="http://schemas.microsoft.com/office/powerpoint/2010/main" val="572143329"/>
       </p:ext>
     </p:extLst>
   </p:cSld>

</xml_diff>